<commit_message>
Update Honegumi RAG Assistant logo assets
</commit_message>
<xml_diff>
--- a/docs/_static/honegumi_rag_assistant_logo.pptx
+++ b/docs/_static/honegumi_rag_assistant_logo.pptx
@@ -260,7 +260,7 @@
           <a:p>
             <a:fld id="{568E16AA-E7DF-4EC8-AF10-2DC26BE8841B}" type="datetimeFigureOut">
               <a:rPr lang="en-US" smtClean="0"/>
-              <a:t>10/18/2025</a:t>
+              <a:t>10/20/2025</a:t>
             </a:fld>
             <a:endParaRPr lang="en-US"/>
           </a:p>
@@ -458,7 +458,7 @@
           <a:p>
             <a:fld id="{568E16AA-E7DF-4EC8-AF10-2DC26BE8841B}" type="datetimeFigureOut">
               <a:rPr lang="en-US" smtClean="0"/>
-              <a:t>10/18/2025</a:t>
+              <a:t>10/20/2025</a:t>
             </a:fld>
             <a:endParaRPr lang="en-US"/>
           </a:p>
@@ -666,7 +666,7 @@
           <a:p>
             <a:fld id="{568E16AA-E7DF-4EC8-AF10-2DC26BE8841B}" type="datetimeFigureOut">
               <a:rPr lang="en-US" smtClean="0"/>
-              <a:t>10/18/2025</a:t>
+              <a:t>10/20/2025</a:t>
             </a:fld>
             <a:endParaRPr lang="en-US"/>
           </a:p>
@@ -864,7 +864,7 @@
           <a:p>
             <a:fld id="{568E16AA-E7DF-4EC8-AF10-2DC26BE8841B}" type="datetimeFigureOut">
               <a:rPr lang="en-US" smtClean="0"/>
-              <a:t>10/18/2025</a:t>
+              <a:t>10/20/2025</a:t>
             </a:fld>
             <a:endParaRPr lang="en-US"/>
           </a:p>
@@ -1139,7 +1139,7 @@
           <a:p>
             <a:fld id="{568E16AA-E7DF-4EC8-AF10-2DC26BE8841B}" type="datetimeFigureOut">
               <a:rPr lang="en-US" smtClean="0"/>
-              <a:t>10/18/2025</a:t>
+              <a:t>10/20/2025</a:t>
             </a:fld>
             <a:endParaRPr lang="en-US"/>
           </a:p>
@@ -1404,7 +1404,7 @@
           <a:p>
             <a:fld id="{568E16AA-E7DF-4EC8-AF10-2DC26BE8841B}" type="datetimeFigureOut">
               <a:rPr lang="en-US" smtClean="0"/>
-              <a:t>10/18/2025</a:t>
+              <a:t>10/20/2025</a:t>
             </a:fld>
             <a:endParaRPr lang="en-US"/>
           </a:p>
@@ -1816,7 +1816,7 @@
           <a:p>
             <a:fld id="{568E16AA-E7DF-4EC8-AF10-2DC26BE8841B}" type="datetimeFigureOut">
               <a:rPr lang="en-US" smtClean="0"/>
-              <a:t>10/18/2025</a:t>
+              <a:t>10/20/2025</a:t>
             </a:fld>
             <a:endParaRPr lang="en-US"/>
           </a:p>
@@ -1957,7 +1957,7 @@
           <a:p>
             <a:fld id="{568E16AA-E7DF-4EC8-AF10-2DC26BE8841B}" type="datetimeFigureOut">
               <a:rPr lang="en-US" smtClean="0"/>
-              <a:t>10/18/2025</a:t>
+              <a:t>10/20/2025</a:t>
             </a:fld>
             <a:endParaRPr lang="en-US"/>
           </a:p>
@@ -2070,7 +2070,7 @@
           <a:p>
             <a:fld id="{568E16AA-E7DF-4EC8-AF10-2DC26BE8841B}" type="datetimeFigureOut">
               <a:rPr lang="en-US" smtClean="0"/>
-              <a:t>10/18/2025</a:t>
+              <a:t>10/20/2025</a:t>
             </a:fld>
             <a:endParaRPr lang="en-US"/>
           </a:p>
@@ -2381,7 +2381,7 @@
           <a:p>
             <a:fld id="{568E16AA-E7DF-4EC8-AF10-2DC26BE8841B}" type="datetimeFigureOut">
               <a:rPr lang="en-US" smtClean="0"/>
-              <a:t>10/18/2025</a:t>
+              <a:t>10/20/2025</a:t>
             </a:fld>
             <a:endParaRPr lang="en-US"/>
           </a:p>
@@ -2669,7 +2669,7 @@
           <a:p>
             <a:fld id="{568E16AA-E7DF-4EC8-AF10-2DC26BE8841B}" type="datetimeFigureOut">
               <a:rPr lang="en-US" smtClean="0"/>
-              <a:t>10/18/2025</a:t>
+              <a:t>10/20/2025</a:t>
             </a:fld>
             <a:endParaRPr lang="en-US"/>
           </a:p>
@@ -2910,7 +2910,7 @@
           <a:p>
             <a:fld id="{568E16AA-E7DF-4EC8-AF10-2DC26BE8841B}" type="datetimeFigureOut">
               <a:rPr lang="en-US" smtClean="0"/>
-              <a:t>10/18/2025</a:t>
+              <a:t>10/20/2025</a:t>
             </a:fld>
             <a:endParaRPr lang="en-US"/>
           </a:p>
@@ -3407,6 +3407,260 @@
           <a:chExt cx="0" cy="0"/>
         </a:xfrm>
       </p:grpSpPr>
+      <p:grpSp>
+        <p:nvGrpSpPr>
+          <p:cNvPr id="63" name="Group 62">
+            <a:extLst>
+              <a:ext uri="{FF2B5EF4-FFF2-40B4-BE49-F238E27FC236}">
+                <a16:creationId xmlns:a16="http://schemas.microsoft.com/office/drawing/2014/main" id="{86BB4041-E0D1-4A77-A58F-1143CF384162}"/>
+              </a:ext>
+            </a:extLst>
+          </p:cNvPr>
+          <p:cNvGrpSpPr/>
+          <p:nvPr/>
+        </p:nvGrpSpPr>
+        <p:grpSpPr>
+          <a:xfrm>
+            <a:off x="5975549" y="2341371"/>
+            <a:ext cx="626851" cy="801414"/>
+            <a:chOff x="8758447" y="892438"/>
+            <a:chExt cx="626851" cy="801414"/>
+          </a:xfrm>
+        </p:grpSpPr>
+        <p:sp>
+          <p:nvSpPr>
+            <p:cNvPr id="65" name="Rectangle: Rounded Corners 64">
+              <a:extLst>
+                <a:ext uri="{FF2B5EF4-FFF2-40B4-BE49-F238E27FC236}">
+                  <a16:creationId xmlns:a16="http://schemas.microsoft.com/office/drawing/2014/main" id="{92247047-DCD0-473D-9851-0C51B960A2D0}"/>
+                </a:ext>
+              </a:extLst>
+            </p:cNvPr>
+            <p:cNvSpPr/>
+            <p:nvPr/>
+          </p:nvSpPr>
+          <p:spPr>
+            <a:xfrm>
+              <a:off x="8758447" y="892438"/>
+              <a:ext cx="529742" cy="724532"/>
+            </a:xfrm>
+            <a:prstGeom prst="roundRect">
+              <a:avLst/>
+            </a:prstGeom>
+            <a:noFill/>
+            <a:ln w="69850">
+              <a:solidFill>
+                <a:schemeClr val="tx1"/>
+              </a:solidFill>
+            </a:ln>
+          </p:spPr>
+          <p:style>
+            <a:lnRef idx="2">
+              <a:schemeClr val="accent1">
+                <a:shade val="50000"/>
+              </a:schemeClr>
+            </a:lnRef>
+            <a:fillRef idx="1">
+              <a:schemeClr val="accent1"/>
+            </a:fillRef>
+            <a:effectRef idx="0">
+              <a:schemeClr val="accent1"/>
+            </a:effectRef>
+            <a:fontRef idx="minor">
+              <a:schemeClr val="lt1"/>
+            </a:fontRef>
+          </p:style>
+          <p:txBody>
+            <a:bodyPr rtlCol="0" anchor="ctr"/>
+            <a:lstStyle/>
+            <a:p>
+              <a:pPr algn="ctr"/>
+              <a:endParaRPr lang="en-US"/>
+            </a:p>
+          </p:txBody>
+        </p:sp>
+        <p:sp>
+          <p:nvSpPr>
+            <p:cNvPr id="68" name="Rectangle: Rounded Corners 67">
+              <a:extLst>
+                <a:ext uri="{FF2B5EF4-FFF2-40B4-BE49-F238E27FC236}">
+                  <a16:creationId xmlns:a16="http://schemas.microsoft.com/office/drawing/2014/main" id="{57626259-9D81-46C6-9420-36F95447E92A}"/>
+                </a:ext>
+              </a:extLst>
+            </p:cNvPr>
+            <p:cNvSpPr/>
+            <p:nvPr/>
+          </p:nvSpPr>
+          <p:spPr>
+            <a:xfrm>
+              <a:off x="8953395" y="1073141"/>
+              <a:ext cx="431903" cy="620711"/>
+            </a:xfrm>
+            <a:prstGeom prst="roundRect">
+              <a:avLst/>
+            </a:prstGeom>
+            <a:solidFill>
+              <a:schemeClr val="bg1"/>
+            </a:solidFill>
+            <a:ln>
+              <a:solidFill>
+                <a:schemeClr val="bg1"/>
+              </a:solidFill>
+            </a:ln>
+          </p:spPr>
+          <p:style>
+            <a:lnRef idx="2">
+              <a:schemeClr val="accent1">
+                <a:shade val="50000"/>
+              </a:schemeClr>
+            </a:lnRef>
+            <a:fillRef idx="1">
+              <a:schemeClr val="accent1"/>
+            </a:fillRef>
+            <a:effectRef idx="0">
+              <a:schemeClr val="accent1"/>
+            </a:effectRef>
+            <a:fontRef idx="minor">
+              <a:schemeClr val="lt1"/>
+            </a:fontRef>
+          </p:style>
+          <p:txBody>
+            <a:bodyPr rtlCol="0" anchor="ctr"/>
+            <a:lstStyle/>
+            <a:p>
+              <a:pPr algn="ctr"/>
+              <a:endParaRPr lang="en-US"/>
+            </a:p>
+          </p:txBody>
+        </p:sp>
+      </p:grpSp>
+      <p:grpSp>
+        <p:nvGrpSpPr>
+          <p:cNvPr id="4" name="Group 3">
+            <a:extLst>
+              <a:ext uri="{FF2B5EF4-FFF2-40B4-BE49-F238E27FC236}">
+                <a16:creationId xmlns:a16="http://schemas.microsoft.com/office/drawing/2014/main" id="{5BF0AA97-6936-4D5C-B439-64DC56510407}"/>
+              </a:ext>
+            </a:extLst>
+          </p:cNvPr>
+          <p:cNvGrpSpPr/>
+          <p:nvPr/>
+        </p:nvGrpSpPr>
+        <p:grpSpPr>
+          <a:xfrm>
+            <a:off x="6175739" y="2474215"/>
+            <a:ext cx="626851" cy="801414"/>
+            <a:chOff x="8758447" y="892438"/>
+            <a:chExt cx="626851" cy="801414"/>
+          </a:xfrm>
+        </p:grpSpPr>
+        <p:sp>
+          <p:nvSpPr>
+            <p:cNvPr id="2" name="Rectangle: Rounded Corners 1">
+              <a:extLst>
+                <a:ext uri="{FF2B5EF4-FFF2-40B4-BE49-F238E27FC236}">
+                  <a16:creationId xmlns:a16="http://schemas.microsoft.com/office/drawing/2014/main" id="{426CF94A-7221-479C-B0F7-9B871296968E}"/>
+                </a:ext>
+              </a:extLst>
+            </p:cNvPr>
+            <p:cNvSpPr/>
+            <p:nvPr/>
+          </p:nvSpPr>
+          <p:spPr>
+            <a:xfrm>
+              <a:off x="8758447" y="892438"/>
+              <a:ext cx="529742" cy="724532"/>
+            </a:xfrm>
+            <a:prstGeom prst="roundRect">
+              <a:avLst/>
+            </a:prstGeom>
+            <a:noFill/>
+            <a:ln w="69850">
+              <a:solidFill>
+                <a:schemeClr val="tx1"/>
+              </a:solidFill>
+            </a:ln>
+          </p:spPr>
+          <p:style>
+            <a:lnRef idx="2">
+              <a:schemeClr val="accent1">
+                <a:shade val="50000"/>
+              </a:schemeClr>
+            </a:lnRef>
+            <a:fillRef idx="1">
+              <a:schemeClr val="accent1"/>
+            </a:fillRef>
+            <a:effectRef idx="0">
+              <a:schemeClr val="accent1"/>
+            </a:effectRef>
+            <a:fontRef idx="minor">
+              <a:schemeClr val="lt1"/>
+            </a:fontRef>
+          </p:style>
+          <p:txBody>
+            <a:bodyPr rtlCol="0" anchor="ctr"/>
+            <a:lstStyle/>
+            <a:p>
+              <a:pPr algn="ctr"/>
+              <a:endParaRPr lang="en-US"/>
+            </a:p>
+          </p:txBody>
+        </p:sp>
+        <p:sp>
+          <p:nvSpPr>
+            <p:cNvPr id="3" name="Rectangle: Rounded Corners 2">
+              <a:extLst>
+                <a:ext uri="{FF2B5EF4-FFF2-40B4-BE49-F238E27FC236}">
+                  <a16:creationId xmlns:a16="http://schemas.microsoft.com/office/drawing/2014/main" id="{D76355D4-F747-4AB8-AC14-732A281D6115}"/>
+                </a:ext>
+              </a:extLst>
+            </p:cNvPr>
+            <p:cNvSpPr/>
+            <p:nvPr/>
+          </p:nvSpPr>
+          <p:spPr>
+            <a:xfrm>
+              <a:off x="8953395" y="1073141"/>
+              <a:ext cx="431903" cy="620711"/>
+            </a:xfrm>
+            <a:prstGeom prst="roundRect">
+              <a:avLst/>
+            </a:prstGeom>
+            <a:solidFill>
+              <a:schemeClr val="bg1"/>
+            </a:solidFill>
+            <a:ln>
+              <a:solidFill>
+                <a:schemeClr val="bg1"/>
+              </a:solidFill>
+            </a:ln>
+          </p:spPr>
+          <p:style>
+            <a:lnRef idx="2">
+              <a:schemeClr val="accent1">
+                <a:shade val="50000"/>
+              </a:schemeClr>
+            </a:lnRef>
+            <a:fillRef idx="1">
+              <a:schemeClr val="accent1"/>
+            </a:fillRef>
+            <a:effectRef idx="0">
+              <a:schemeClr val="accent1"/>
+            </a:effectRef>
+            <a:fontRef idx="minor">
+              <a:schemeClr val="lt1"/>
+            </a:fontRef>
+          </p:style>
+          <p:txBody>
+            <a:bodyPr rtlCol="0" anchor="ctr"/>
+            <a:lstStyle/>
+            <a:p>
+              <a:pPr algn="ctr"/>
+              <a:endParaRPr lang="en-US"/>
+            </a:p>
+          </p:txBody>
+        </p:sp>
+      </p:grpSp>
       <p:sp>
         <p:nvSpPr>
           <p:cNvPr id="58" name="Rectangle 57">
@@ -3747,42 +4001,6 @@
             </a:prstGeom>
           </p:spPr>
         </p:pic>
-        <p:pic>
-          <p:nvPicPr>
-            <p:cNvPr id="52" name="Picture 51">
-              <a:extLst>
-                <a:ext uri="{FF2B5EF4-FFF2-40B4-BE49-F238E27FC236}">
-                  <a16:creationId xmlns:a16="http://schemas.microsoft.com/office/drawing/2014/main" id="{B0F4AA06-FF74-45C9-A65D-F8BDE52DAD26}"/>
-                </a:ext>
-              </a:extLst>
-            </p:cNvPr>
-            <p:cNvPicPr>
-              <a:picLocks noChangeAspect="1"/>
-            </p:cNvPicPr>
-            <p:nvPr/>
-          </p:nvPicPr>
-          <p:blipFill>
-            <a:blip r:embed="rId7">
-              <a:extLst>
-                <a:ext uri="{28A0092B-C50C-407E-A947-70E740481C1C}">
-                  <a14:useLocalDpi xmlns:a14="http://schemas.microsoft.com/office/drawing/2010/main" val="0"/>
-                </a:ext>
-              </a:extLst>
-            </a:blip>
-            <a:stretch>
-              <a:fillRect/>
-            </a:stretch>
-          </p:blipFill>
-          <p:spPr>
-            <a:xfrm>
-              <a:off x="5880091" y="2794811"/>
-              <a:ext cx="896719" cy="896719"/>
-            </a:xfrm>
-            <a:prstGeom prst="rect">
-              <a:avLst/>
-            </a:prstGeom>
-          </p:spPr>
-        </p:pic>
         <p:cxnSp>
           <p:nvCxnSpPr>
             <p:cNvPr id="53" name="Straight Arrow Connector 52">
@@ -3863,7 +4081,7 @@
               <p:nvPr/>
             </p:nvPicPr>
             <p:blipFill>
-              <a:blip r:embed="rId8">
+              <a:blip r:embed="rId7">
                 <a:extLst>
                   <a:ext uri="{28A0092B-C50C-407E-A947-70E740481C1C}">
                     <a14:useLocalDpi xmlns:a14="http://schemas.microsoft.com/office/drawing/2010/main" val="0"/>
@@ -4157,8 +4375,8 @@
           </p:nvSpPr>
           <p:spPr>
             <a:xfrm>
-              <a:off x="5714166" y="3599286"/>
-              <a:ext cx="1153959" cy="367664"/>
+              <a:off x="5712873" y="3681810"/>
+              <a:ext cx="1153959" cy="642997"/>
             </a:xfrm>
             <a:prstGeom prst="rect">
               <a:avLst/>
@@ -4173,9 +4391,10 @@
             <a:p>
               <a:pPr algn="ctr"/>
               <a:r>
-                <a:rPr lang="en-US" sz="1789" dirty="0"/>
-                <a:t>Retriever</a:t>
+                <a:rPr lang="en-US" sz="1789"/>
+                <a:t>Parallel Retrievers</a:t>
               </a:r>
+              <a:endParaRPr lang="en-US" sz="1789" dirty="0"/>
             </a:p>
           </p:txBody>
         </p:sp>
@@ -4302,7 +4521,7 @@
             <p:nvPr/>
           </p:nvPicPr>
           <p:blipFill>
-            <a:blip r:embed="rId9">
+            <a:blip r:embed="rId8">
               <a:extLst>
                 <a:ext uri="{28A0092B-C50C-407E-A947-70E740481C1C}">
                   <a14:useLocalDpi xmlns:a14="http://schemas.microsoft.com/office/drawing/2010/main" val="0"/>
@@ -4358,7 +4577,7 @@
               <p:nvPr/>
             </p:nvPicPr>
             <p:blipFill>
-              <a:blip r:embed="rId10">
+              <a:blip r:embed="rId9">
                 <a:extLst>
                   <a:ext uri="{28A0092B-C50C-407E-A947-70E740481C1C}">
                     <a14:useLocalDpi xmlns:a14="http://schemas.microsoft.com/office/drawing/2010/main" val="0"/>
@@ -4628,7 +4847,7 @@
               <p:nvPr/>
             </p:nvPicPr>
             <p:blipFill>
-              <a:blip r:embed="rId10">
+              <a:blip r:embed="rId9">
                 <a:extLst>
                   <a:ext uri="{28A0092B-C50C-407E-A947-70E740481C1C}">
                     <a14:useLocalDpi xmlns:a14="http://schemas.microsoft.com/office/drawing/2010/main" val="0"/>
@@ -4909,7 +5128,7 @@
               <p:nvPr/>
             </p:nvPicPr>
             <p:blipFill>
-              <a:blip r:embed="rId10">
+              <a:blip r:embed="rId9">
                 <a:extLst>
                   <a:ext uri="{28A0092B-C50C-407E-A947-70E740481C1C}">
                     <a14:useLocalDpi xmlns:a14="http://schemas.microsoft.com/office/drawing/2010/main" val="0"/>
@@ -5071,7 +5290,7 @@
             <p:nvPr/>
           </p:nvPicPr>
           <p:blipFill>
-            <a:blip r:embed="rId11"/>
+            <a:blip r:embed="rId10"/>
             <a:stretch>
               <a:fillRect/>
             </a:stretch>
@@ -5215,6 +5434,42 @@
             </a:fontRef>
           </p:style>
         </p:cxnSp>
+        <p:pic>
+          <p:nvPicPr>
+            <p:cNvPr id="52" name="Picture 51">
+              <a:extLst>
+                <a:ext uri="{FF2B5EF4-FFF2-40B4-BE49-F238E27FC236}">
+                  <a16:creationId xmlns:a16="http://schemas.microsoft.com/office/drawing/2014/main" id="{B0F4AA06-FF74-45C9-A65D-F8BDE52DAD26}"/>
+                </a:ext>
+              </a:extLst>
+            </p:cNvPr>
+            <p:cNvPicPr>
+              <a:picLocks noChangeAspect="1"/>
+            </p:cNvPicPr>
+            <p:nvPr/>
+          </p:nvPicPr>
+          <p:blipFill>
+            <a:blip r:embed="rId11">
+              <a:extLst>
+                <a:ext uri="{28A0092B-C50C-407E-A947-70E740481C1C}">
+                  <a14:useLocalDpi xmlns:a14="http://schemas.microsoft.com/office/drawing/2010/main" val="0"/>
+                </a:ext>
+              </a:extLst>
+            </a:blip>
+            <a:stretch>
+              <a:fillRect/>
+            </a:stretch>
+          </p:blipFill>
+          <p:spPr>
+            <a:xfrm>
+              <a:off x="5985021" y="2794811"/>
+              <a:ext cx="896719" cy="896719"/>
+            </a:xfrm>
+            <a:prstGeom prst="rect">
+              <a:avLst/>
+            </a:prstGeom>
+          </p:spPr>
+        </p:pic>
       </p:grpSp>
       <p:cxnSp>
         <p:nvCxnSpPr>
@@ -5233,7 +5488,7 @@
         <p:spPr>
           <a:xfrm>
             <a:off x="5542587" y="3080616"/>
-            <a:ext cx="531748" cy="0"/>
+            <a:ext cx="318567" cy="0"/>
           </a:xfrm>
           <a:prstGeom prst="straightConnector1">
             <a:avLst/>
@@ -5277,7 +5532,7 @@
         <p:spPr>
           <a:xfrm>
             <a:off x="6540722" y="1768306"/>
-            <a:ext cx="0" cy="746868"/>
+            <a:ext cx="0" cy="401254"/>
           </a:xfrm>
           <a:prstGeom prst="straightConnector1">
             <a:avLst/>

</xml_diff>

<commit_message>
Update contact email in README and refresh logo assets
</commit_message>
<xml_diff>
--- a/docs/_static/honegumi_rag_assistant_logo.pptx
+++ b/docs/_static/honegumi_rag_assistant_logo.pptx
@@ -260,7 +260,7 @@
           <a:p>
             <a:fld id="{568E16AA-E7DF-4EC8-AF10-2DC26BE8841B}" type="datetimeFigureOut">
               <a:rPr lang="en-US" smtClean="0"/>
-              <a:t>10/20/2025</a:t>
+              <a:t>10/22/2025</a:t>
             </a:fld>
             <a:endParaRPr lang="en-US"/>
           </a:p>
@@ -458,7 +458,7 @@
           <a:p>
             <a:fld id="{568E16AA-E7DF-4EC8-AF10-2DC26BE8841B}" type="datetimeFigureOut">
               <a:rPr lang="en-US" smtClean="0"/>
-              <a:t>10/20/2025</a:t>
+              <a:t>10/22/2025</a:t>
             </a:fld>
             <a:endParaRPr lang="en-US"/>
           </a:p>
@@ -666,7 +666,7 @@
           <a:p>
             <a:fld id="{568E16AA-E7DF-4EC8-AF10-2DC26BE8841B}" type="datetimeFigureOut">
               <a:rPr lang="en-US" smtClean="0"/>
-              <a:t>10/20/2025</a:t>
+              <a:t>10/22/2025</a:t>
             </a:fld>
             <a:endParaRPr lang="en-US"/>
           </a:p>
@@ -864,7 +864,7 @@
           <a:p>
             <a:fld id="{568E16AA-E7DF-4EC8-AF10-2DC26BE8841B}" type="datetimeFigureOut">
               <a:rPr lang="en-US" smtClean="0"/>
-              <a:t>10/20/2025</a:t>
+              <a:t>10/22/2025</a:t>
             </a:fld>
             <a:endParaRPr lang="en-US"/>
           </a:p>
@@ -1139,7 +1139,7 @@
           <a:p>
             <a:fld id="{568E16AA-E7DF-4EC8-AF10-2DC26BE8841B}" type="datetimeFigureOut">
               <a:rPr lang="en-US" smtClean="0"/>
-              <a:t>10/20/2025</a:t>
+              <a:t>10/22/2025</a:t>
             </a:fld>
             <a:endParaRPr lang="en-US"/>
           </a:p>
@@ -1404,7 +1404,7 @@
           <a:p>
             <a:fld id="{568E16AA-E7DF-4EC8-AF10-2DC26BE8841B}" type="datetimeFigureOut">
               <a:rPr lang="en-US" smtClean="0"/>
-              <a:t>10/20/2025</a:t>
+              <a:t>10/22/2025</a:t>
             </a:fld>
             <a:endParaRPr lang="en-US"/>
           </a:p>
@@ -1816,7 +1816,7 @@
           <a:p>
             <a:fld id="{568E16AA-E7DF-4EC8-AF10-2DC26BE8841B}" type="datetimeFigureOut">
               <a:rPr lang="en-US" smtClean="0"/>
-              <a:t>10/20/2025</a:t>
+              <a:t>10/22/2025</a:t>
             </a:fld>
             <a:endParaRPr lang="en-US"/>
           </a:p>
@@ -1957,7 +1957,7 @@
           <a:p>
             <a:fld id="{568E16AA-E7DF-4EC8-AF10-2DC26BE8841B}" type="datetimeFigureOut">
               <a:rPr lang="en-US" smtClean="0"/>
-              <a:t>10/20/2025</a:t>
+              <a:t>10/22/2025</a:t>
             </a:fld>
             <a:endParaRPr lang="en-US"/>
           </a:p>
@@ -2070,7 +2070,7 @@
           <a:p>
             <a:fld id="{568E16AA-E7DF-4EC8-AF10-2DC26BE8841B}" type="datetimeFigureOut">
               <a:rPr lang="en-US" smtClean="0"/>
-              <a:t>10/20/2025</a:t>
+              <a:t>10/22/2025</a:t>
             </a:fld>
             <a:endParaRPr lang="en-US"/>
           </a:p>
@@ -2381,7 +2381,7 @@
           <a:p>
             <a:fld id="{568E16AA-E7DF-4EC8-AF10-2DC26BE8841B}" type="datetimeFigureOut">
               <a:rPr lang="en-US" smtClean="0"/>
-              <a:t>10/20/2025</a:t>
+              <a:t>10/22/2025</a:t>
             </a:fld>
             <a:endParaRPr lang="en-US"/>
           </a:p>
@@ -2669,7 +2669,7 @@
           <a:p>
             <a:fld id="{568E16AA-E7DF-4EC8-AF10-2DC26BE8841B}" type="datetimeFigureOut">
               <a:rPr lang="en-US" smtClean="0"/>
-              <a:t>10/20/2025</a:t>
+              <a:t>10/22/2025</a:t>
             </a:fld>
             <a:endParaRPr lang="en-US"/>
           </a:p>
@@ -2910,7 +2910,7 @@
           <a:p>
             <a:fld id="{568E16AA-E7DF-4EC8-AF10-2DC26BE8841B}" type="datetimeFigureOut">
               <a:rPr lang="en-US" smtClean="0"/>
-              <a:t>10/20/2025</a:t>
+              <a:t>10/22/2025</a:t>
             </a:fld>
             <a:endParaRPr lang="en-US"/>
           </a:p>
@@ -3409,10 +3409,10 @@
       </p:grpSpPr>
       <p:grpSp>
         <p:nvGrpSpPr>
-          <p:cNvPr id="63" name="Group 62">
-            <a:extLst>
-              <a:ext uri="{FF2B5EF4-FFF2-40B4-BE49-F238E27FC236}">
-                <a16:creationId xmlns:a16="http://schemas.microsoft.com/office/drawing/2014/main" id="{86BB4041-E0D1-4A77-A58F-1143CF384162}"/>
+          <p:cNvPr id="10" name="Group 9">
+            <a:extLst>
+              <a:ext uri="{FF2B5EF4-FFF2-40B4-BE49-F238E27FC236}">
+                <a16:creationId xmlns:a16="http://schemas.microsoft.com/office/drawing/2014/main" id="{B8670B67-ACD6-42AA-83E5-FF9830C94754}"/>
               </a:ext>
             </a:extLst>
           </p:cNvPr>
@@ -3421,245 +3421,266 @@
         </p:nvGrpSpPr>
         <p:grpSpPr>
           <a:xfrm>
-            <a:off x="5975549" y="2341371"/>
-            <a:ext cx="626851" cy="801414"/>
-            <a:chOff x="8758447" y="892438"/>
-            <a:chExt cx="626851" cy="801414"/>
+            <a:off x="6310594" y="1172652"/>
+            <a:ext cx="452208" cy="543405"/>
+            <a:chOff x="8809829" y="1103636"/>
+            <a:chExt cx="452208" cy="543405"/>
           </a:xfrm>
         </p:grpSpPr>
-        <p:sp>
-          <p:nvSpPr>
-            <p:cNvPr id="65" name="Rectangle: Rounded Corners 64">
+        <p:grpSp>
+          <p:nvGrpSpPr>
+            <p:cNvPr id="80" name="Group 79">
               <a:extLst>
                 <a:ext uri="{FF2B5EF4-FFF2-40B4-BE49-F238E27FC236}">
-                  <a16:creationId xmlns:a16="http://schemas.microsoft.com/office/drawing/2014/main" id="{92247047-DCD0-473D-9851-0C51B960A2D0}"/>
+                  <a16:creationId xmlns:a16="http://schemas.microsoft.com/office/drawing/2014/main" id="{FE826E72-F64E-4DBC-99A8-15D5736E50C9}"/>
                 </a:ext>
               </a:extLst>
             </p:cNvPr>
-            <p:cNvSpPr/>
+            <p:cNvGrpSpPr/>
             <p:nvPr/>
-          </p:nvSpPr>
-          <p:spPr>
+          </p:nvGrpSpPr>
+          <p:grpSpPr>
             <a:xfrm>
-              <a:off x="8758447" y="892438"/>
-              <a:ext cx="529742" cy="724532"/>
+              <a:off x="8809829" y="1103636"/>
+              <a:ext cx="342294" cy="437618"/>
+              <a:chOff x="8758450" y="892438"/>
+              <a:chExt cx="626848" cy="801414"/>
             </a:xfrm>
-            <a:prstGeom prst="roundRect">
-              <a:avLst/>
-            </a:prstGeom>
-            <a:noFill/>
-            <a:ln w="69850">
+          </p:grpSpPr>
+          <p:sp>
+            <p:nvSpPr>
+              <p:cNvPr id="81" name="Rectangle: Rounded Corners 80">
+                <a:extLst>
+                  <a:ext uri="{FF2B5EF4-FFF2-40B4-BE49-F238E27FC236}">
+                    <a16:creationId xmlns:a16="http://schemas.microsoft.com/office/drawing/2014/main" id="{87F24326-094A-4BA3-97BC-42A9B89B2334}"/>
+                  </a:ext>
+                </a:extLst>
+              </p:cNvPr>
+              <p:cNvSpPr/>
+              <p:nvPr/>
+            </p:nvSpPr>
+            <p:spPr>
+              <a:xfrm>
+                <a:off x="8758450" y="892438"/>
+                <a:ext cx="529742" cy="724532"/>
+              </a:xfrm>
+              <a:prstGeom prst="roundRect">
+                <a:avLst/>
+              </a:prstGeom>
+              <a:noFill/>
+              <a:ln w="31750">
+                <a:solidFill>
+                  <a:schemeClr val="tx1"/>
+                </a:solidFill>
+              </a:ln>
+            </p:spPr>
+            <p:style>
+              <a:lnRef idx="2">
+                <a:schemeClr val="accent1">
+                  <a:shade val="50000"/>
+                </a:schemeClr>
+              </a:lnRef>
+              <a:fillRef idx="1">
+                <a:schemeClr val="accent1"/>
+              </a:fillRef>
+              <a:effectRef idx="0">
+                <a:schemeClr val="accent1"/>
+              </a:effectRef>
+              <a:fontRef idx="minor">
+                <a:schemeClr val="lt1"/>
+              </a:fontRef>
+            </p:style>
+            <p:txBody>
+              <a:bodyPr rtlCol="0" anchor="ctr"/>
+              <a:lstStyle/>
+              <a:p>
+                <a:pPr algn="ctr"/>
+                <a:endParaRPr lang="en-US"/>
+              </a:p>
+            </p:txBody>
+          </p:sp>
+          <p:sp>
+            <p:nvSpPr>
+              <p:cNvPr id="85" name="Rectangle: Rounded Corners 84">
+                <a:extLst>
+                  <a:ext uri="{FF2B5EF4-FFF2-40B4-BE49-F238E27FC236}">
+                    <a16:creationId xmlns:a16="http://schemas.microsoft.com/office/drawing/2014/main" id="{5BBFF38F-1FEE-46C5-A1E5-56982C9A4FDB}"/>
+                  </a:ext>
+                </a:extLst>
+              </p:cNvPr>
+              <p:cNvSpPr/>
+              <p:nvPr/>
+            </p:nvSpPr>
+            <p:spPr>
+              <a:xfrm>
+                <a:off x="8953395" y="1073141"/>
+                <a:ext cx="431903" cy="620711"/>
+              </a:xfrm>
+              <a:prstGeom prst="roundRect">
+                <a:avLst/>
+              </a:prstGeom>
               <a:solidFill>
-                <a:schemeClr val="tx1"/>
+                <a:schemeClr val="bg1"/>
               </a:solidFill>
-            </a:ln>
-          </p:spPr>
-          <p:style>
-            <a:lnRef idx="2">
-              <a:schemeClr val="accent1">
-                <a:shade val="50000"/>
-              </a:schemeClr>
-            </a:lnRef>
-            <a:fillRef idx="1">
-              <a:schemeClr val="accent1"/>
-            </a:fillRef>
-            <a:effectRef idx="0">
-              <a:schemeClr val="accent1"/>
-            </a:effectRef>
-            <a:fontRef idx="minor">
-              <a:schemeClr val="lt1"/>
-            </a:fontRef>
-          </p:style>
-          <p:txBody>
-            <a:bodyPr rtlCol="0" anchor="ctr"/>
-            <a:lstStyle/>
-            <a:p>
-              <a:pPr algn="ctr"/>
-              <a:endParaRPr lang="en-US"/>
-            </a:p>
-          </p:txBody>
-        </p:sp>
-        <p:sp>
-          <p:nvSpPr>
-            <p:cNvPr id="68" name="Rectangle: Rounded Corners 67">
+              <a:ln>
+                <a:solidFill>
+                  <a:schemeClr val="bg1"/>
+                </a:solidFill>
+              </a:ln>
+            </p:spPr>
+            <p:style>
+              <a:lnRef idx="2">
+                <a:schemeClr val="accent1">
+                  <a:shade val="50000"/>
+                </a:schemeClr>
+              </a:lnRef>
+              <a:fillRef idx="1">
+                <a:schemeClr val="accent1"/>
+              </a:fillRef>
+              <a:effectRef idx="0">
+                <a:schemeClr val="accent1"/>
+              </a:effectRef>
+              <a:fontRef idx="minor">
+                <a:schemeClr val="lt1"/>
+              </a:fontRef>
+            </p:style>
+            <p:txBody>
+              <a:bodyPr rtlCol="0" anchor="ctr"/>
+              <a:lstStyle/>
+              <a:p>
+                <a:pPr algn="ctr"/>
+                <a:endParaRPr lang="en-US" dirty="0"/>
+              </a:p>
+            </p:txBody>
+          </p:sp>
+        </p:grpSp>
+        <p:grpSp>
+          <p:nvGrpSpPr>
+            <p:cNvPr id="72" name="Group 71">
               <a:extLst>
                 <a:ext uri="{FF2B5EF4-FFF2-40B4-BE49-F238E27FC236}">
-                  <a16:creationId xmlns:a16="http://schemas.microsoft.com/office/drawing/2014/main" id="{57626259-9D81-46C6-9420-36F95447E92A}"/>
+                  <a16:creationId xmlns:a16="http://schemas.microsoft.com/office/drawing/2014/main" id="{CE48A54E-1488-48DE-A69C-9CC310BEEC53}"/>
                 </a:ext>
               </a:extLst>
             </p:cNvPr>
-            <p:cNvSpPr/>
+            <p:cNvGrpSpPr/>
             <p:nvPr/>
-          </p:nvSpPr>
-          <p:spPr>
+          </p:nvGrpSpPr>
+          <p:grpSpPr>
             <a:xfrm>
-              <a:off x="8953395" y="1073141"/>
-              <a:ext cx="431903" cy="620711"/>
+              <a:off x="8919743" y="1209423"/>
+              <a:ext cx="342294" cy="437618"/>
+              <a:chOff x="8758450" y="892438"/>
+              <a:chExt cx="626848" cy="801414"/>
             </a:xfrm>
-            <a:prstGeom prst="roundRect">
-              <a:avLst/>
-            </a:prstGeom>
-            <a:solidFill>
-              <a:schemeClr val="bg1"/>
-            </a:solidFill>
-            <a:ln>
+          </p:grpSpPr>
+          <p:sp>
+            <p:nvSpPr>
+              <p:cNvPr id="73" name="Rectangle: Rounded Corners 72">
+                <a:extLst>
+                  <a:ext uri="{FF2B5EF4-FFF2-40B4-BE49-F238E27FC236}">
+                    <a16:creationId xmlns:a16="http://schemas.microsoft.com/office/drawing/2014/main" id="{20910323-62E0-48C2-85D0-658396DEEE6F}"/>
+                  </a:ext>
+                </a:extLst>
+              </p:cNvPr>
+              <p:cNvSpPr/>
+              <p:nvPr/>
+            </p:nvSpPr>
+            <p:spPr>
+              <a:xfrm>
+                <a:off x="8758450" y="892438"/>
+                <a:ext cx="529742" cy="724532"/>
+              </a:xfrm>
+              <a:prstGeom prst="roundRect">
+                <a:avLst/>
+              </a:prstGeom>
+              <a:noFill/>
+              <a:ln w="31750">
+                <a:solidFill>
+                  <a:schemeClr val="tx1"/>
+                </a:solidFill>
+              </a:ln>
+            </p:spPr>
+            <p:style>
+              <a:lnRef idx="2">
+                <a:schemeClr val="accent1">
+                  <a:shade val="50000"/>
+                </a:schemeClr>
+              </a:lnRef>
+              <a:fillRef idx="1">
+                <a:schemeClr val="accent1"/>
+              </a:fillRef>
+              <a:effectRef idx="0">
+                <a:schemeClr val="accent1"/>
+              </a:effectRef>
+              <a:fontRef idx="minor">
+                <a:schemeClr val="lt1"/>
+              </a:fontRef>
+            </p:style>
+            <p:txBody>
+              <a:bodyPr rtlCol="0" anchor="ctr"/>
+              <a:lstStyle/>
+              <a:p>
+                <a:pPr algn="ctr"/>
+                <a:endParaRPr lang="en-US"/>
+              </a:p>
+            </p:txBody>
+          </p:sp>
+          <p:sp>
+            <p:nvSpPr>
+              <p:cNvPr id="78" name="Rectangle: Rounded Corners 77">
+                <a:extLst>
+                  <a:ext uri="{FF2B5EF4-FFF2-40B4-BE49-F238E27FC236}">
+                    <a16:creationId xmlns:a16="http://schemas.microsoft.com/office/drawing/2014/main" id="{2FDA4D90-4DB8-4DC4-BC37-E05756987038}"/>
+                  </a:ext>
+                </a:extLst>
+              </p:cNvPr>
+              <p:cNvSpPr/>
+              <p:nvPr/>
+            </p:nvSpPr>
+            <p:spPr>
+              <a:xfrm>
+                <a:off x="8953395" y="1073141"/>
+                <a:ext cx="431903" cy="620711"/>
+              </a:xfrm>
+              <a:prstGeom prst="roundRect">
+                <a:avLst/>
+              </a:prstGeom>
               <a:solidFill>
                 <a:schemeClr val="bg1"/>
               </a:solidFill>
-            </a:ln>
-          </p:spPr>
-          <p:style>
-            <a:lnRef idx="2">
-              <a:schemeClr val="accent1">
-                <a:shade val="50000"/>
-              </a:schemeClr>
-            </a:lnRef>
-            <a:fillRef idx="1">
-              <a:schemeClr val="accent1"/>
-            </a:fillRef>
-            <a:effectRef idx="0">
-              <a:schemeClr val="accent1"/>
-            </a:effectRef>
-            <a:fontRef idx="minor">
-              <a:schemeClr val="lt1"/>
-            </a:fontRef>
-          </p:style>
-          <p:txBody>
-            <a:bodyPr rtlCol="0" anchor="ctr"/>
-            <a:lstStyle/>
-            <a:p>
-              <a:pPr algn="ctr"/>
-              <a:endParaRPr lang="en-US"/>
-            </a:p>
-          </p:txBody>
-        </p:sp>
-      </p:grpSp>
-      <p:grpSp>
-        <p:nvGrpSpPr>
-          <p:cNvPr id="4" name="Group 3">
-            <a:extLst>
-              <a:ext uri="{FF2B5EF4-FFF2-40B4-BE49-F238E27FC236}">
-                <a16:creationId xmlns:a16="http://schemas.microsoft.com/office/drawing/2014/main" id="{5BF0AA97-6936-4D5C-B439-64DC56510407}"/>
-              </a:ext>
-            </a:extLst>
-          </p:cNvPr>
-          <p:cNvGrpSpPr/>
-          <p:nvPr/>
-        </p:nvGrpSpPr>
-        <p:grpSpPr>
-          <a:xfrm>
-            <a:off x="6175739" y="2474215"/>
-            <a:ext cx="626851" cy="801414"/>
-            <a:chOff x="8758447" y="892438"/>
-            <a:chExt cx="626851" cy="801414"/>
-          </a:xfrm>
-        </p:grpSpPr>
-        <p:sp>
-          <p:nvSpPr>
-            <p:cNvPr id="2" name="Rectangle: Rounded Corners 1">
-              <a:extLst>
-                <a:ext uri="{FF2B5EF4-FFF2-40B4-BE49-F238E27FC236}">
-                  <a16:creationId xmlns:a16="http://schemas.microsoft.com/office/drawing/2014/main" id="{426CF94A-7221-479C-B0F7-9B871296968E}"/>
-                </a:ext>
-              </a:extLst>
-            </p:cNvPr>
-            <p:cNvSpPr/>
-            <p:nvPr/>
-          </p:nvSpPr>
-          <p:spPr>
-            <a:xfrm>
-              <a:off x="8758447" y="892438"/>
-              <a:ext cx="529742" cy="724532"/>
-            </a:xfrm>
-            <a:prstGeom prst="roundRect">
-              <a:avLst/>
-            </a:prstGeom>
-            <a:noFill/>
-            <a:ln w="69850">
-              <a:solidFill>
-                <a:schemeClr val="tx1"/>
-              </a:solidFill>
-            </a:ln>
-          </p:spPr>
-          <p:style>
-            <a:lnRef idx="2">
-              <a:schemeClr val="accent1">
-                <a:shade val="50000"/>
-              </a:schemeClr>
-            </a:lnRef>
-            <a:fillRef idx="1">
-              <a:schemeClr val="accent1"/>
-            </a:fillRef>
-            <a:effectRef idx="0">
-              <a:schemeClr val="accent1"/>
-            </a:effectRef>
-            <a:fontRef idx="minor">
-              <a:schemeClr val="lt1"/>
-            </a:fontRef>
-          </p:style>
-          <p:txBody>
-            <a:bodyPr rtlCol="0" anchor="ctr"/>
-            <a:lstStyle/>
-            <a:p>
-              <a:pPr algn="ctr"/>
-              <a:endParaRPr lang="en-US"/>
-            </a:p>
-          </p:txBody>
-        </p:sp>
-        <p:sp>
-          <p:nvSpPr>
-            <p:cNvPr id="3" name="Rectangle: Rounded Corners 2">
-              <a:extLst>
-                <a:ext uri="{FF2B5EF4-FFF2-40B4-BE49-F238E27FC236}">
-                  <a16:creationId xmlns:a16="http://schemas.microsoft.com/office/drawing/2014/main" id="{D76355D4-F747-4AB8-AC14-732A281D6115}"/>
-                </a:ext>
-              </a:extLst>
-            </p:cNvPr>
-            <p:cNvSpPr/>
-            <p:nvPr/>
-          </p:nvSpPr>
-          <p:spPr>
-            <a:xfrm>
-              <a:off x="8953395" y="1073141"/>
-              <a:ext cx="431903" cy="620711"/>
-            </a:xfrm>
-            <a:prstGeom prst="roundRect">
-              <a:avLst/>
-            </a:prstGeom>
-            <a:solidFill>
-              <a:schemeClr val="bg1"/>
-            </a:solidFill>
-            <a:ln>
-              <a:solidFill>
-                <a:schemeClr val="bg1"/>
-              </a:solidFill>
-            </a:ln>
-          </p:spPr>
-          <p:style>
-            <a:lnRef idx="2">
-              <a:schemeClr val="accent1">
-                <a:shade val="50000"/>
-              </a:schemeClr>
-            </a:lnRef>
-            <a:fillRef idx="1">
-              <a:schemeClr val="accent1"/>
-            </a:fillRef>
-            <a:effectRef idx="0">
-              <a:schemeClr val="accent1"/>
-            </a:effectRef>
-            <a:fontRef idx="minor">
-              <a:schemeClr val="lt1"/>
-            </a:fontRef>
-          </p:style>
-          <p:txBody>
-            <a:bodyPr rtlCol="0" anchor="ctr"/>
-            <a:lstStyle/>
-            <a:p>
-              <a:pPr algn="ctr"/>
-              <a:endParaRPr lang="en-US"/>
-            </a:p>
-          </p:txBody>
-        </p:sp>
+              <a:ln>
+                <a:solidFill>
+                  <a:schemeClr val="bg1"/>
+                </a:solidFill>
+              </a:ln>
+            </p:spPr>
+            <p:style>
+              <a:lnRef idx="2">
+                <a:schemeClr val="accent1">
+                  <a:shade val="50000"/>
+                </a:schemeClr>
+              </a:lnRef>
+              <a:fillRef idx="1">
+                <a:schemeClr val="accent1"/>
+              </a:fillRef>
+              <a:effectRef idx="0">
+                <a:schemeClr val="accent1"/>
+              </a:effectRef>
+              <a:fontRef idx="minor">
+                <a:schemeClr val="lt1"/>
+              </a:fontRef>
+            </p:style>
+            <p:txBody>
+              <a:bodyPr rtlCol="0" anchor="ctr"/>
+              <a:lstStyle/>
+              <a:p>
+                <a:pPr algn="ctr"/>
+                <a:endParaRPr lang="en-US"/>
+              </a:p>
+            </p:txBody>
+          </p:sp>
+        </p:grpSp>
       </p:grpSp>
       <p:sp>
         <p:nvSpPr>
@@ -3675,7 +3696,7 @@
         </p:nvSpPr>
         <p:spPr>
           <a:xfrm>
-            <a:off x="5663857" y="1038171"/>
+            <a:off x="5693401" y="257955"/>
             <a:ext cx="1756650" cy="602659"/>
           </a:xfrm>
           <a:prstGeom prst="rect">
@@ -3727,10 +3748,10 @@
         </p:nvGrpSpPr>
         <p:grpSpPr>
           <a:xfrm>
-            <a:off x="265095" y="650450"/>
-            <a:ext cx="11661810" cy="5600223"/>
-            <a:chOff x="-25367" y="864001"/>
-            <a:chExt cx="11661810" cy="5600223"/>
+            <a:off x="265095" y="278419"/>
+            <a:ext cx="11661810" cy="5972254"/>
+            <a:chOff x="-25367" y="491970"/>
+            <a:chExt cx="11661810" cy="5972254"/>
           </a:xfrm>
         </p:grpSpPr>
         <p:pic>
@@ -4375,8 +4396,8 @@
           </p:nvSpPr>
           <p:spPr>
             <a:xfrm>
-              <a:off x="5712873" y="3681810"/>
-              <a:ext cx="1153959" cy="642997"/>
+              <a:off x="5523881" y="1974153"/>
+              <a:ext cx="1607145" cy="307777"/>
             </a:xfrm>
             <a:prstGeom prst="rect">
               <a:avLst/>
@@ -4391,10 +4412,9 @@
             <a:p>
               <a:pPr algn="ctr"/>
               <a:r>
-                <a:rPr lang="en-US" sz="1789"/>
+                <a:rPr lang="en-US" sz="1400" dirty="0"/>
                 <a:t>Parallel Retrievers</a:t>
               </a:r>
-              <a:endParaRPr lang="en-US" sz="1789" dirty="0"/>
             </a:p>
           </p:txBody>
         </p:sp>
@@ -4641,7 +4661,7 @@
               <a:lstStyle/>
               <a:p>
                 <a:pPr algn="ctr"/>
-                <a:endParaRPr lang="en-US" sz="2400"/>
+                <a:endParaRPr lang="en-US" sz="2400" dirty="0"/>
               </a:p>
             </p:txBody>
           </p:sp>
@@ -4680,7 +4700,7 @@
                   <a:latin typeface="Arial" panose="020B0604020202020204" pitchFamily="34" charset="0"/>
                   <a:cs typeface="Arial" panose="020B0604020202020204" pitchFamily="34" charset="0"/>
                 </a:rPr>
-                <a:t>Feature Agent</a:t>
+                <a:t>Parameter Agent</a:t>
               </a:r>
             </a:p>
           </p:txBody>
@@ -4700,7 +4720,7 @@
           <p:spPr>
             <a:xfrm>
               <a:off x="1564972" y="3824684"/>
-              <a:ext cx="1214829" cy="620713"/>
+              <a:ext cx="1214829" cy="646331"/>
             </a:xfrm>
             <a:prstGeom prst="rect">
               <a:avLst/>
@@ -4719,7 +4739,7 @@
                   <a:latin typeface="Arial" panose="020B0604020202020204" pitchFamily="34" charset="0"/>
                   <a:cs typeface="Arial" panose="020B0604020202020204" pitchFamily="34" charset="0"/>
                 </a:rPr>
-                <a:t>Is retrieved context sufficient?</a:t>
+                <a:t>Decides optimization parameters</a:t>
               </a:r>
             </a:p>
           </p:txBody>
@@ -4826,10 +4846,10 @@
           </p:nvGrpSpPr>
           <p:grpSpPr>
             <a:xfrm>
-              <a:off x="7380149" y="2498798"/>
-              <a:ext cx="917016" cy="1976153"/>
-              <a:chOff x="2859041" y="103413"/>
-              <a:chExt cx="1059804" cy="2283858"/>
+              <a:off x="7343175" y="2498798"/>
+              <a:ext cx="1011110" cy="1976153"/>
+              <a:chOff x="2816309" y="103413"/>
+              <a:chExt cx="1168549" cy="2283858"/>
             </a:xfrm>
           </p:grpSpPr>
           <p:pic>
@@ -4882,8 +4902,8 @@
             </p:nvSpPr>
             <p:spPr>
               <a:xfrm>
-                <a:off x="2859041" y="103413"/>
-                <a:ext cx="1059804" cy="2283858"/>
+                <a:off x="2816309" y="103413"/>
+                <a:ext cx="1168549" cy="2283858"/>
               </a:xfrm>
               <a:prstGeom prst="roundRect">
                 <a:avLst/>
@@ -4970,7 +4990,7 @@
           <p:spPr>
             <a:xfrm>
               <a:off x="7238329" y="3824683"/>
-              <a:ext cx="1214829" cy="620713"/>
+              <a:ext cx="1214829" cy="646331"/>
             </a:xfrm>
             <a:prstGeom prst="rect">
               <a:avLst/>
@@ -4989,7 +5009,7 @@
                   <a:latin typeface="Arial" panose="020B0604020202020204" pitchFamily="34" charset="0"/>
                   <a:cs typeface="Arial" panose="020B0604020202020204" pitchFamily="34" charset="0"/>
                 </a:rPr>
-                <a:t>Is retrieved context sufficient?</a:t>
+                <a:t>Adapts skeleton code to problem</a:t>
               </a:r>
             </a:p>
           </p:txBody>
@@ -5010,8 +5030,8 @@
           </p:nvCxnSpPr>
           <p:spPr>
             <a:xfrm>
-              <a:off x="6808525" y="3294167"/>
-              <a:ext cx="425748" cy="0"/>
+              <a:off x="6758118" y="3294167"/>
+              <a:ext cx="491289" cy="0"/>
             </a:xfrm>
             <a:prstGeom prst="straightConnector1">
               <a:avLst/>
@@ -5251,7 +5271,7 @@
           <p:spPr>
             <a:xfrm>
               <a:off x="8942183" y="3823556"/>
-              <a:ext cx="1214829" cy="620713"/>
+              <a:ext cx="1214829" cy="461665"/>
             </a:xfrm>
             <a:prstGeom prst="rect">
               <a:avLst/>
@@ -5270,7 +5290,17 @@
                   <a:latin typeface="Arial" panose="020B0604020202020204" pitchFamily="34" charset="0"/>
                   <a:cs typeface="Arial" panose="020B0604020202020204" pitchFamily="34" charset="0"/>
                 </a:rPr>
-                <a:t>Is retrieved context sufficient?</a:t>
+                <a:t>Assesses </a:t>
+              </a:r>
+            </a:p>
+            <a:p>
+              <a:pPr algn="ctr"/>
+              <a:r>
+                <a:rPr lang="en-US" sz="1200" dirty="0">
+                  <a:latin typeface="Arial" panose="020B0604020202020204" pitchFamily="34" charset="0"/>
+                  <a:cs typeface="Arial" panose="020B0604020202020204" pitchFamily="34" charset="0"/>
+                </a:rPr>
+                <a:t>code quality</a:t>
               </a:r>
             </a:p>
           </p:txBody>
@@ -5297,7 +5327,7 @@
           </p:blipFill>
           <p:spPr>
             <a:xfrm>
-              <a:off x="5783873" y="1286692"/>
+              <a:off x="5799007" y="491970"/>
               <a:ext cx="833553" cy="286145"/>
             </a:xfrm>
             <a:prstGeom prst="rect">
@@ -5319,7 +5349,7 @@
           </p:nvSpPr>
           <p:spPr>
             <a:xfrm>
-              <a:off x="5297988" y="1578266"/>
+              <a:off x="5313122" y="783544"/>
               <a:ext cx="1936285" cy="367665"/>
             </a:xfrm>
             <a:prstGeom prst="rect">
@@ -5351,6 +5381,7 @@
               </a:extLst>
             </p:cNvPr>
             <p:cNvCxnSpPr>
+              <a:cxnSpLocks/>
               <a:stCxn id="94" idx="2"/>
               <a:endCxn id="79" idx="2"/>
             </p:cNvCxnSpPr>
@@ -5358,12 +5389,12 @@
           </p:nvCxnSpPr>
           <p:spPr>
             <a:xfrm rot="5400000" flipH="1" flipV="1">
-              <a:off x="4219774" y="872878"/>
-              <a:ext cx="16810" cy="7220956"/>
+              <a:off x="4224810" y="867841"/>
+              <a:ext cx="16810" cy="7231029"/>
             </a:xfrm>
             <a:prstGeom prst="bentConnector3">
               <a:avLst>
-                <a:gd name="adj1" fmla="val -3363974"/>
+                <a:gd name="adj1" fmla="val -1359905"/>
               </a:avLst>
             </a:prstGeom>
             <a:ln w="25400">
@@ -5405,8 +5436,8 @@
           </p:nvCxnSpPr>
           <p:spPr>
             <a:xfrm rot="10800000">
-              <a:off x="2172387" y="4445397"/>
-              <a:ext cx="5431446" cy="1403288"/>
+              <a:off x="2172387" y="4471015"/>
+              <a:ext cx="5431446" cy="1377670"/>
             </a:xfrm>
             <a:prstGeom prst="bentConnector2">
               <a:avLst/>
@@ -5462,8 +5493,8 @@
           </p:blipFill>
           <p:spPr>
             <a:xfrm>
-              <a:off x="5985021" y="2794811"/>
-              <a:ext cx="896719" cy="896719"/>
+              <a:off x="6209558" y="1562286"/>
+              <a:ext cx="426439" cy="426439"/>
             </a:xfrm>
             <a:prstGeom prst="rect">
               <a:avLst/>
@@ -5531,8 +5562,8 @@
         </p:nvCxnSpPr>
         <p:spPr>
           <a:xfrm>
-            <a:off x="6540722" y="1768306"/>
-            <a:ext cx="0" cy="401254"/>
+            <a:off x="6617916" y="900122"/>
+            <a:ext cx="0" cy="247996"/>
           </a:xfrm>
           <a:prstGeom prst="straightConnector1">
             <a:avLst/>
@@ -5592,6 +5623,339 @@
             <a:r>
               <a:rPr lang="en-US" sz="1200" dirty="0"/>
               <a:t>Optional</a:t>
+            </a:r>
+          </a:p>
+        </p:txBody>
+      </p:sp>
+      <p:pic>
+        <p:nvPicPr>
+          <p:cNvPr id="87" name="Picture 86">
+            <a:extLst>
+              <a:ext uri="{FF2B5EF4-FFF2-40B4-BE49-F238E27FC236}">
+                <a16:creationId xmlns:a16="http://schemas.microsoft.com/office/drawing/2014/main" id="{72437ADD-D472-49ED-86EE-D464A009EAE8}"/>
+              </a:ext>
+            </a:extLst>
+          </p:cNvPr>
+          <p:cNvPicPr>
+            <a:picLocks noChangeAspect="1"/>
+          </p:cNvPicPr>
+          <p:nvPr/>
+        </p:nvPicPr>
+        <p:blipFill>
+          <a:blip r:embed="rId9">
+            <a:extLst>
+              <a:ext uri="{28A0092B-C50C-407E-A947-70E740481C1C}">
+                <a14:useLocalDpi xmlns:a14="http://schemas.microsoft.com/office/drawing/2010/main" val="0"/>
+              </a:ext>
+            </a:extLst>
+          </a:blip>
+          <a:stretch>
+            <a:fillRect/>
+          </a:stretch>
+        </p:blipFill>
+        <p:spPr>
+          <a:xfrm>
+            <a:off x="6054259" y="2980285"/>
+            <a:ext cx="771544" cy="771544"/>
+          </a:xfrm>
+          <a:prstGeom prst="rect">
+            <a:avLst/>
+          </a:prstGeom>
+        </p:spPr>
+      </p:pic>
+      <p:sp>
+        <p:nvSpPr>
+          <p:cNvPr id="93" name="Rectangle: Rounded Corners 92">
+            <a:extLst>
+              <a:ext uri="{FF2B5EF4-FFF2-40B4-BE49-F238E27FC236}">
+                <a16:creationId xmlns:a16="http://schemas.microsoft.com/office/drawing/2014/main" id="{AA0F593E-6044-4154-9EDA-29511D816D53}"/>
+              </a:ext>
+            </a:extLst>
+          </p:cNvPr>
+          <p:cNvSpPr/>
+          <p:nvPr/>
+        </p:nvSpPr>
+        <p:spPr>
+          <a:xfrm>
+            <a:off x="5933948" y="2507393"/>
+            <a:ext cx="1025038" cy="1806540"/>
+          </a:xfrm>
+          <a:prstGeom prst="roundRect">
+            <a:avLst/>
+          </a:prstGeom>
+          <a:noFill/>
+        </p:spPr>
+        <p:style>
+          <a:lnRef idx="2">
+            <a:schemeClr val="accent1">
+              <a:shade val="50000"/>
+            </a:schemeClr>
+          </a:lnRef>
+          <a:fillRef idx="1">
+            <a:schemeClr val="accent1"/>
+          </a:fillRef>
+          <a:effectRef idx="0">
+            <a:schemeClr val="accent1"/>
+          </a:effectRef>
+          <a:fontRef idx="minor">
+            <a:schemeClr val="lt1"/>
+          </a:fontRef>
+        </p:style>
+        <p:txBody>
+          <a:bodyPr rtlCol="0" anchor="ctr"/>
+          <a:lstStyle/>
+          <a:p>
+            <a:pPr algn="ctr"/>
+            <a:endParaRPr lang="en-US" sz="2400"/>
+          </a:p>
+        </p:txBody>
+      </p:sp>
+      <p:sp>
+        <p:nvSpPr>
+          <p:cNvPr id="95" name="TextBox 94">
+            <a:extLst>
+              <a:ext uri="{FF2B5EF4-FFF2-40B4-BE49-F238E27FC236}">
+                <a16:creationId xmlns:a16="http://schemas.microsoft.com/office/drawing/2014/main" id="{F391D9D6-93B1-45D2-9345-09CCD2200344}"/>
+              </a:ext>
+            </a:extLst>
+          </p:cNvPr>
+          <p:cNvSpPr txBox="1"/>
+          <p:nvPr/>
+        </p:nvSpPr>
+        <p:spPr>
+          <a:xfrm>
+            <a:off x="5889295" y="2507392"/>
+            <a:ext cx="1103747" cy="461665"/>
+          </a:xfrm>
+          <a:prstGeom prst="rect">
+            <a:avLst/>
+          </a:prstGeom>
+          <a:noFill/>
+        </p:spPr>
+        <p:txBody>
+          <a:bodyPr wrap="square" rtlCol="0">
+            <a:spAutoFit/>
+          </a:bodyPr>
+          <a:lstStyle/>
+          <a:p>
+            <a:pPr algn="ctr"/>
+            <a:r>
+              <a:rPr lang="en-US" sz="1200" b="1" dirty="0">
+                <a:latin typeface="Arial" panose="020B0604020202020204" pitchFamily="34" charset="0"/>
+                <a:cs typeface="Arial" panose="020B0604020202020204" pitchFamily="34" charset="0"/>
+              </a:rPr>
+              <a:t>Retrieval Agent</a:t>
+            </a:r>
+          </a:p>
+        </p:txBody>
+      </p:sp>
+      <p:sp>
+        <p:nvSpPr>
+          <p:cNvPr id="96" name="TextBox 95">
+            <a:extLst>
+              <a:ext uri="{FF2B5EF4-FFF2-40B4-BE49-F238E27FC236}">
+                <a16:creationId xmlns:a16="http://schemas.microsoft.com/office/drawing/2014/main" id="{5F411774-317F-427D-9E5A-EF483D560F12}"/>
+              </a:ext>
+            </a:extLst>
+          </p:cNvPr>
+          <p:cNvSpPr txBox="1"/>
+          <p:nvPr/>
+        </p:nvSpPr>
+        <p:spPr>
+          <a:xfrm>
+            <a:off x="5833751" y="3833277"/>
+            <a:ext cx="1214829" cy="461665"/>
+          </a:xfrm>
+          <a:prstGeom prst="rect">
+            <a:avLst/>
+          </a:prstGeom>
+          <a:noFill/>
+        </p:spPr>
+        <p:txBody>
+          <a:bodyPr wrap="square" rtlCol="0">
+            <a:spAutoFit/>
+          </a:bodyPr>
+          <a:lstStyle/>
+          <a:p>
+            <a:pPr algn="ctr"/>
+            <a:r>
+              <a:rPr lang="en-US" sz="1200" dirty="0">
+                <a:latin typeface="Arial" panose="020B0604020202020204" pitchFamily="34" charset="0"/>
+                <a:cs typeface="Arial" panose="020B0604020202020204" pitchFamily="34" charset="0"/>
+              </a:rPr>
+              <a:t>Skeleton code enough?</a:t>
+            </a:r>
+          </a:p>
+        </p:txBody>
+      </p:sp>
+      <p:sp>
+        <p:nvSpPr>
+          <p:cNvPr id="97" name="TextBox 96">
+            <a:extLst>
+              <a:ext uri="{FF2B5EF4-FFF2-40B4-BE49-F238E27FC236}">
+                <a16:creationId xmlns:a16="http://schemas.microsoft.com/office/drawing/2014/main" id="{6A5C42D5-F47D-4301-A4AD-3F4B10120269}"/>
+              </a:ext>
+            </a:extLst>
+          </p:cNvPr>
+          <p:cNvSpPr txBox="1"/>
+          <p:nvPr/>
+        </p:nvSpPr>
+        <p:spPr>
+          <a:xfrm>
+            <a:off x="7037300" y="2718430"/>
+            <a:ext cx="428641" cy="307777"/>
+          </a:xfrm>
+          <a:prstGeom prst="rect">
+            <a:avLst/>
+          </a:prstGeom>
+          <a:noFill/>
+        </p:spPr>
+        <p:txBody>
+          <a:bodyPr wrap="square" rtlCol="0">
+            <a:spAutoFit/>
+          </a:bodyPr>
+          <a:lstStyle/>
+          <a:p>
+            <a:pPr algn="ctr"/>
+            <a:r>
+              <a:rPr lang="en-US" sz="1400" dirty="0"/>
+              <a:t>Yes</a:t>
+            </a:r>
+          </a:p>
+        </p:txBody>
+      </p:sp>
+      <p:cxnSp>
+        <p:nvCxnSpPr>
+          <p:cNvPr id="98" name="Straight Arrow Connector 97">
+            <a:extLst>
+              <a:ext uri="{FF2B5EF4-FFF2-40B4-BE49-F238E27FC236}">
+                <a16:creationId xmlns:a16="http://schemas.microsoft.com/office/drawing/2014/main" id="{077AB10D-F8C0-4E41-B26C-0BAE2490C577}"/>
+              </a:ext>
+            </a:extLst>
+          </p:cNvPr>
+          <p:cNvCxnSpPr>
+            <a:cxnSpLocks/>
+          </p:cNvCxnSpPr>
+          <p:nvPr/>
+        </p:nvCxnSpPr>
+        <p:spPr>
+          <a:xfrm flipV="1">
+            <a:off x="6381835" y="2068379"/>
+            <a:ext cx="0" cy="391847"/>
+          </a:xfrm>
+          <a:prstGeom prst="straightConnector1">
+            <a:avLst/>
+          </a:prstGeom>
+          <a:ln w="25400">
+            <a:solidFill>
+              <a:schemeClr val="tx1"/>
+            </a:solidFill>
+            <a:prstDash val="dash"/>
+            <a:tailEnd type="triangle"/>
+          </a:ln>
+        </p:spPr>
+        <p:style>
+          <a:lnRef idx="1">
+            <a:schemeClr val="accent1"/>
+          </a:lnRef>
+          <a:fillRef idx="0">
+            <a:schemeClr val="accent1"/>
+          </a:fillRef>
+          <a:effectRef idx="0">
+            <a:schemeClr val="accent1"/>
+          </a:effectRef>
+          <a:fontRef idx="minor">
+            <a:schemeClr val="tx1"/>
+          </a:fontRef>
+        </p:style>
+      </p:cxnSp>
+      <p:sp>
+        <p:nvSpPr>
+          <p:cNvPr id="99" name="Arc 98">
+            <a:extLst>
+              <a:ext uri="{FF2B5EF4-FFF2-40B4-BE49-F238E27FC236}">
+                <a16:creationId xmlns:a16="http://schemas.microsoft.com/office/drawing/2014/main" id="{B07CC85F-060F-40F0-8D63-C03995CF2F5E}"/>
+              </a:ext>
+            </a:extLst>
+          </p:cNvPr>
+          <p:cNvSpPr/>
+          <p:nvPr/>
+        </p:nvSpPr>
+        <p:spPr>
+          <a:xfrm rot="4399413">
+            <a:off x="5124227" y="1531284"/>
+            <a:ext cx="1471386" cy="1471386"/>
+          </a:xfrm>
+          <a:prstGeom prst="arc">
+            <a:avLst>
+              <a:gd name="adj1" fmla="val 16200000"/>
+              <a:gd name="adj2" fmla="val 18048541"/>
+            </a:avLst>
+          </a:prstGeom>
+          <a:ln w="25400">
+            <a:solidFill>
+              <a:schemeClr val="tx1"/>
+            </a:solidFill>
+            <a:prstDash val="solid"/>
+            <a:headEnd type="none"/>
+            <a:tailEnd type="arrow"/>
+          </a:ln>
+        </p:spPr>
+        <p:style>
+          <a:lnRef idx="1">
+            <a:schemeClr val="accent1"/>
+          </a:lnRef>
+          <a:fillRef idx="0">
+            <a:schemeClr val="accent1"/>
+          </a:fillRef>
+          <a:effectRef idx="0">
+            <a:schemeClr val="accent1"/>
+          </a:effectRef>
+          <a:fontRef idx="minor">
+            <a:schemeClr val="tx1"/>
+          </a:fontRef>
+        </p:style>
+        <p:txBody>
+          <a:bodyPr rtlCol="0" anchor="ctr"/>
+          <a:lstStyle/>
+          <a:p>
+            <a:pPr algn="ctr"/>
+            <a:endParaRPr lang="en-US" dirty="0"/>
+          </a:p>
+        </p:txBody>
+      </p:sp>
+      <p:sp>
+        <p:nvSpPr>
+          <p:cNvPr id="100" name="TextBox 99">
+            <a:extLst>
+              <a:ext uri="{FF2B5EF4-FFF2-40B4-BE49-F238E27FC236}">
+                <a16:creationId xmlns:a16="http://schemas.microsoft.com/office/drawing/2014/main" id="{AC9BA565-28EE-4E06-9228-9F168CD118D4}"/>
+              </a:ext>
+            </a:extLst>
+          </p:cNvPr>
+          <p:cNvSpPr txBox="1"/>
+          <p:nvPr/>
+        </p:nvSpPr>
+        <p:spPr>
+          <a:xfrm>
+            <a:off x="5941637" y="2112832"/>
+            <a:ext cx="428641" cy="307777"/>
+          </a:xfrm>
+          <a:prstGeom prst="rect">
+            <a:avLst/>
+          </a:prstGeom>
+          <a:noFill/>
+        </p:spPr>
+        <p:txBody>
+          <a:bodyPr wrap="square" rtlCol="0">
+            <a:spAutoFit/>
+          </a:bodyPr>
+          <a:lstStyle/>
+          <a:p>
+            <a:pPr algn="ctr"/>
+            <a:r>
+              <a:rPr lang="en-US" sz="1400" dirty="0"/>
+              <a:t>No</a:t>
             </a:r>
           </a:p>
         </p:txBody>

</xml_diff>